<commit_message>
lots of work on filaments
</commit_message>
<xml_diff>
--- a/docs/Smoldyn/figures/SmoldynFigures.pptx
+++ b/docs/Smoldyn/figures/SmoldynFigures.pptx
@@ -243,7 +243,7 @@
           <a:p>
             <a:fld id="{D48BD193-EA7E-AF43-A664-A67EA7E8EE18}" type="datetimeFigureOut">
               <a:rPr lang="en-US" smtClean="0"/>
-              <a:t>8/28/24</a:t>
+              <a:t>5/3/25</a:t>
             </a:fld>
             <a:endParaRPr lang="en-US"/>
           </a:p>
@@ -413,7 +413,7 @@
           <a:p>
             <a:fld id="{D48BD193-EA7E-AF43-A664-A67EA7E8EE18}" type="datetimeFigureOut">
               <a:rPr lang="en-US" smtClean="0"/>
-              <a:t>8/28/24</a:t>
+              <a:t>5/3/25</a:t>
             </a:fld>
             <a:endParaRPr lang="en-US"/>
           </a:p>
@@ -593,7 +593,7 @@
           <a:p>
             <a:fld id="{D48BD193-EA7E-AF43-A664-A67EA7E8EE18}" type="datetimeFigureOut">
               <a:rPr lang="en-US" smtClean="0"/>
-              <a:t>8/28/24</a:t>
+              <a:t>5/3/25</a:t>
             </a:fld>
             <a:endParaRPr lang="en-US"/>
           </a:p>
@@ -763,7 +763,7 @@
           <a:p>
             <a:fld id="{D48BD193-EA7E-AF43-A664-A67EA7E8EE18}" type="datetimeFigureOut">
               <a:rPr lang="en-US" smtClean="0"/>
-              <a:t>8/28/24</a:t>
+              <a:t>5/3/25</a:t>
             </a:fld>
             <a:endParaRPr lang="en-US"/>
           </a:p>
@@ -1009,7 +1009,7 @@
           <a:p>
             <a:fld id="{D48BD193-EA7E-AF43-A664-A67EA7E8EE18}" type="datetimeFigureOut">
               <a:rPr lang="en-US" smtClean="0"/>
-              <a:t>8/28/24</a:t>
+              <a:t>5/3/25</a:t>
             </a:fld>
             <a:endParaRPr lang="en-US"/>
           </a:p>
@@ -1241,7 +1241,7 @@
           <a:p>
             <a:fld id="{D48BD193-EA7E-AF43-A664-A67EA7E8EE18}" type="datetimeFigureOut">
               <a:rPr lang="en-US" smtClean="0"/>
-              <a:t>8/28/24</a:t>
+              <a:t>5/3/25</a:t>
             </a:fld>
             <a:endParaRPr lang="en-US"/>
           </a:p>
@@ -1608,7 +1608,7 @@
           <a:p>
             <a:fld id="{D48BD193-EA7E-AF43-A664-A67EA7E8EE18}" type="datetimeFigureOut">
               <a:rPr lang="en-US" smtClean="0"/>
-              <a:t>8/28/24</a:t>
+              <a:t>5/3/25</a:t>
             </a:fld>
             <a:endParaRPr lang="en-US"/>
           </a:p>
@@ -1726,7 +1726,7 @@
           <a:p>
             <a:fld id="{D48BD193-EA7E-AF43-A664-A67EA7E8EE18}" type="datetimeFigureOut">
               <a:rPr lang="en-US" smtClean="0"/>
-              <a:t>8/28/24</a:t>
+              <a:t>5/3/25</a:t>
             </a:fld>
             <a:endParaRPr lang="en-US"/>
           </a:p>
@@ -1821,7 +1821,7 @@
           <a:p>
             <a:fld id="{D48BD193-EA7E-AF43-A664-A67EA7E8EE18}" type="datetimeFigureOut">
               <a:rPr lang="en-US" smtClean="0"/>
-              <a:t>8/28/24</a:t>
+              <a:t>5/3/25</a:t>
             </a:fld>
             <a:endParaRPr lang="en-US"/>
           </a:p>
@@ -2098,7 +2098,7 @@
           <a:p>
             <a:fld id="{D48BD193-EA7E-AF43-A664-A67EA7E8EE18}" type="datetimeFigureOut">
               <a:rPr lang="en-US" smtClean="0"/>
-              <a:t>8/28/24</a:t>
+              <a:t>5/3/25</a:t>
             </a:fld>
             <a:endParaRPr lang="en-US"/>
           </a:p>
@@ -2355,7 +2355,7 @@
           <a:p>
             <a:fld id="{D48BD193-EA7E-AF43-A664-A67EA7E8EE18}" type="datetimeFigureOut">
               <a:rPr lang="en-US" smtClean="0"/>
-              <a:t>8/28/24</a:t>
+              <a:t>5/3/25</a:t>
             </a:fld>
             <a:endParaRPr lang="en-US"/>
           </a:p>
@@ -2568,7 +2568,7 @@
           <a:p>
             <a:fld id="{D48BD193-EA7E-AF43-A664-A67EA7E8EE18}" type="datetimeFigureOut">
               <a:rPr lang="en-US" smtClean="0"/>
-              <a:t>8/28/24</a:t>
+              <a:t>5/3/25</a:t>
             </a:fld>
             <a:endParaRPr lang="en-US"/>
           </a:p>
@@ -5034,7 +5034,7 @@
           <p:spPr>
             <a:xfrm>
               <a:off x="2458386" y="1130508"/>
-              <a:ext cx="348172" cy="230832"/>
+              <a:ext cx="266420" cy="230832"/>
             </a:xfrm>
             <a:prstGeom prst="rect">
               <a:avLst/>
@@ -5048,21 +5048,14 @@
             <a:lstStyle/>
             <a:p>
               <a:r>
-                <a:rPr lang="en-US" sz="900" dirty="0" err="1">
+                <a:rPr lang="en-US" sz="900" i="1" dirty="0">
                   <a:latin typeface="Symbol" pitchFamily="2" charset="2"/>
                   <a:cs typeface="Times New Roman" panose="02020603050405020304" pitchFamily="18" charset="0"/>
                 </a:rPr>
-                <a:t>D</a:t>
-              </a:r>
-              <a:r>
-                <a:rPr lang="en-US" sz="900" i="1" dirty="0" err="1">
-                  <a:latin typeface="Symbol" pitchFamily="2" charset="2"/>
-                  <a:cs typeface="Times New Roman" panose="02020603050405020304" pitchFamily="18" charset="0"/>
-                </a:rPr>
                 <a:t>f</a:t>
               </a:r>
               <a:r>
-                <a:rPr lang="en-US" sz="900" i="1" baseline="-25000" dirty="0" err="1">
+                <a:rPr lang="en-US" sz="900" i="1" baseline="-25000" dirty="0">
                   <a:latin typeface="Times New Roman" panose="02020603050405020304" pitchFamily="18" charset="0"/>
                   <a:cs typeface="Times New Roman" panose="02020603050405020304" pitchFamily="18" charset="0"/>
                 </a:rPr>
@@ -5586,6 +5579,830 @@
                 <a:srgbClr val="FF0000"/>
               </a:solidFill>
               <a:tailEnd type="triangle"/>
+            </a:ln>
+          </p:spPr>
+          <p:style>
+            <a:lnRef idx="2">
+              <a:schemeClr val="accent1"/>
+            </a:lnRef>
+            <a:fillRef idx="0">
+              <a:schemeClr val="accent1"/>
+            </a:fillRef>
+            <a:effectRef idx="1">
+              <a:schemeClr val="accent1"/>
+            </a:effectRef>
+            <a:fontRef idx="minor">
+              <a:schemeClr val="tx1"/>
+            </a:fontRef>
+          </p:style>
+        </p:cxnSp>
+      </p:grpSp>
+      <p:sp>
+        <p:nvSpPr>
+          <p:cNvPr id="91" name="TextBox 90">
+            <a:extLst>
+              <a:ext uri="{FF2B5EF4-FFF2-40B4-BE49-F238E27FC236}">
+                <a16:creationId xmlns:a16="http://schemas.microsoft.com/office/drawing/2014/main" id="{E3F9D8F7-6FDD-0632-885E-231450BFE8FB}"/>
+              </a:ext>
+            </a:extLst>
+          </p:cNvPr>
+          <p:cNvSpPr txBox="1"/>
+          <p:nvPr/>
+        </p:nvSpPr>
+        <p:spPr>
+          <a:xfrm>
+            <a:off x="957859" y="4829171"/>
+            <a:ext cx="1665841" cy="261610"/>
+          </a:xfrm>
+          <a:prstGeom prst="rect">
+            <a:avLst/>
+          </a:prstGeom>
+          <a:noFill/>
+        </p:spPr>
+        <p:txBody>
+          <a:bodyPr wrap="none" rtlCol="0">
+            <a:spAutoFit/>
+          </a:bodyPr>
+          <a:lstStyle/>
+          <a:p>
+            <a:r>
+              <a:rPr lang="en-US" sz="1100" dirty="0" err="1">
+                <a:latin typeface="Arial" panose="020B0604020202020204" pitchFamily="34" charset="0"/>
+                <a:cs typeface="Arial" panose="020B0604020202020204" pitchFamily="34" charset="0"/>
+              </a:rPr>
+              <a:t>DifferenceSegment.png</a:t>
+            </a:r>
+            <a:endParaRPr lang="en-US" sz="1100" dirty="0">
+              <a:latin typeface="Arial" panose="020B0604020202020204" pitchFamily="34" charset="0"/>
+              <a:cs typeface="Arial" panose="020B0604020202020204" pitchFamily="34" charset="0"/>
+            </a:endParaRPr>
+          </a:p>
+        </p:txBody>
+      </p:sp>
+      <p:grpSp>
+        <p:nvGrpSpPr>
+          <p:cNvPr id="39" name="Group 38">
+            <a:extLst>
+              <a:ext uri="{FF2B5EF4-FFF2-40B4-BE49-F238E27FC236}">
+                <a16:creationId xmlns:a16="http://schemas.microsoft.com/office/drawing/2014/main" id="{F9D82D9B-FE46-D1C7-737D-2113D769D204}"/>
+              </a:ext>
+            </a:extLst>
+          </p:cNvPr>
+          <p:cNvGrpSpPr/>
+          <p:nvPr/>
+        </p:nvGrpSpPr>
+        <p:grpSpPr>
+          <a:xfrm>
+            <a:off x="1491731" y="5205055"/>
+            <a:ext cx="1785591" cy="792256"/>
+            <a:chOff x="1577924" y="5512353"/>
+            <a:chExt cx="1785591" cy="792256"/>
+          </a:xfrm>
+        </p:grpSpPr>
+        <p:sp>
+          <p:nvSpPr>
+            <p:cNvPr id="13" name="Freeform 12">
+              <a:extLst>
+                <a:ext uri="{FF2B5EF4-FFF2-40B4-BE49-F238E27FC236}">
+                  <a16:creationId xmlns:a16="http://schemas.microsoft.com/office/drawing/2014/main" id="{F891D941-6576-CE8B-2E96-A8FD45E77192}"/>
+                </a:ext>
+              </a:extLst>
+            </p:cNvPr>
+            <p:cNvSpPr/>
+            <p:nvPr/>
+          </p:nvSpPr>
+          <p:spPr>
+            <a:xfrm>
+              <a:off x="1768768" y="5613101"/>
+              <a:ext cx="1310748" cy="478302"/>
+            </a:xfrm>
+            <a:custGeom>
+              <a:avLst/>
+              <a:gdLst>
+                <a:gd name="connsiteX0" fmla="*/ 0 w 1448972"/>
+                <a:gd name="connsiteY0" fmla="*/ 450166 h 478302"/>
+                <a:gd name="connsiteX1" fmla="*/ 844062 w 1448972"/>
+                <a:gd name="connsiteY1" fmla="*/ 478302 h 478302"/>
+                <a:gd name="connsiteX2" fmla="*/ 1448972 w 1448972"/>
+                <a:gd name="connsiteY2" fmla="*/ 0 h 478302"/>
+                <a:gd name="connsiteX0" fmla="*/ 0 w 1310748"/>
+                <a:gd name="connsiteY0" fmla="*/ 455482 h 478302"/>
+                <a:gd name="connsiteX1" fmla="*/ 705838 w 1310748"/>
+                <a:gd name="connsiteY1" fmla="*/ 478302 h 478302"/>
+                <a:gd name="connsiteX2" fmla="*/ 1310748 w 1310748"/>
+                <a:gd name="connsiteY2" fmla="*/ 0 h 478302"/>
+              </a:gdLst>
+              <a:ahLst/>
+              <a:cxnLst>
+                <a:cxn ang="0">
+                  <a:pos x="connsiteX0" y="connsiteY0"/>
+                </a:cxn>
+                <a:cxn ang="0">
+                  <a:pos x="connsiteX1" y="connsiteY1"/>
+                </a:cxn>
+                <a:cxn ang="0">
+                  <a:pos x="connsiteX2" y="connsiteY2"/>
+                </a:cxn>
+              </a:cxnLst>
+              <a:rect l="l" t="t" r="r" b="b"/>
+              <a:pathLst>
+                <a:path w="1310748" h="478302">
+                  <a:moveTo>
+                    <a:pt x="0" y="455482"/>
+                  </a:moveTo>
+                  <a:lnTo>
+                    <a:pt x="705838" y="478302"/>
+                  </a:lnTo>
+                  <a:lnTo>
+                    <a:pt x="1310748" y="0"/>
+                  </a:lnTo>
+                </a:path>
+              </a:pathLst>
+            </a:custGeom>
+            <a:noFill/>
+          </p:spPr>
+          <p:style>
+            <a:lnRef idx="2">
+              <a:schemeClr val="accent1">
+                <a:shade val="15000"/>
+              </a:schemeClr>
+            </a:lnRef>
+            <a:fillRef idx="1">
+              <a:schemeClr val="accent1"/>
+            </a:fillRef>
+            <a:effectRef idx="0">
+              <a:schemeClr val="accent1"/>
+            </a:effectRef>
+            <a:fontRef idx="minor">
+              <a:schemeClr val="lt1"/>
+            </a:fontRef>
+          </p:style>
+          <p:txBody>
+            <a:bodyPr rtlCol="0" anchor="ctr"/>
+            <a:lstStyle/>
+            <a:p>
+              <a:pPr algn="ctr"/>
+              <a:endParaRPr lang="en-US"/>
+            </a:p>
+          </p:txBody>
+        </p:sp>
+        <p:sp>
+          <p:nvSpPr>
+            <p:cNvPr id="16" name="TextBox 15">
+              <a:extLst>
+                <a:ext uri="{FF2B5EF4-FFF2-40B4-BE49-F238E27FC236}">
+                  <a16:creationId xmlns:a16="http://schemas.microsoft.com/office/drawing/2014/main" id="{0C1A2CD5-63F2-427A-7504-124A6D5E212E}"/>
+                </a:ext>
+              </a:extLst>
+            </p:cNvPr>
+            <p:cNvSpPr txBox="1"/>
+            <p:nvPr/>
+          </p:nvSpPr>
+          <p:spPr>
+            <a:xfrm>
+              <a:off x="1931266" y="6062168"/>
+              <a:ext cx="397866" cy="230832"/>
+            </a:xfrm>
+            <a:prstGeom prst="rect">
+              <a:avLst/>
+            </a:prstGeom>
+            <a:noFill/>
+          </p:spPr>
+          <p:txBody>
+            <a:bodyPr wrap="none" rtlCol="0">
+              <a:spAutoFit/>
+            </a:bodyPr>
+            <a:lstStyle/>
+            <a:p>
+              <a:r>
+                <a:rPr lang="en-US" sz="900" dirty="0">
+                  <a:latin typeface="Symbol" pitchFamily="2" charset="2"/>
+                  <a:cs typeface="Times New Roman" panose="02020603050405020304" pitchFamily="18" charset="0"/>
+                </a:rPr>
+                <a:t>D</a:t>
+              </a:r>
+              <a:r>
+                <a:rPr lang="en-US" sz="900" b="1" i="1" dirty="0">
+                  <a:latin typeface="Times New Roman" panose="02020603050405020304" pitchFamily="18" charset="0"/>
+                  <a:cs typeface="Times New Roman" panose="02020603050405020304" pitchFamily="18" charset="0"/>
+                </a:rPr>
+                <a:t>x</a:t>
+              </a:r>
+              <a:r>
+                <a:rPr lang="en-US" sz="900" i="1" baseline="-25000" dirty="0">
+                  <a:latin typeface="Times New Roman" panose="02020603050405020304" pitchFamily="18" charset="0"/>
+                  <a:cs typeface="Times New Roman" panose="02020603050405020304" pitchFamily="18" charset="0"/>
+                </a:rPr>
+                <a:t>i</a:t>
+              </a:r>
+              <a:r>
+                <a:rPr lang="en-US" sz="900" baseline="-25000" dirty="0">
+                  <a:latin typeface="Times New Roman" panose="02020603050405020304" pitchFamily="18" charset="0"/>
+                  <a:cs typeface="Times New Roman" panose="02020603050405020304" pitchFamily="18" charset="0"/>
+                </a:rPr>
+                <a:t>-1</a:t>
+              </a:r>
+            </a:p>
+          </p:txBody>
+        </p:sp>
+        <p:sp>
+          <p:nvSpPr>
+            <p:cNvPr id="17" name="TextBox 16">
+              <a:extLst>
+                <a:ext uri="{FF2B5EF4-FFF2-40B4-BE49-F238E27FC236}">
+                  <a16:creationId xmlns:a16="http://schemas.microsoft.com/office/drawing/2014/main" id="{CA127CEC-B451-0F79-8D4B-FB0A30B9C8BE}"/>
+                </a:ext>
+              </a:extLst>
+            </p:cNvPr>
+            <p:cNvSpPr txBox="1"/>
+            <p:nvPr/>
+          </p:nvSpPr>
+          <p:spPr>
+            <a:xfrm>
+              <a:off x="2767725" y="5738307"/>
+              <a:ext cx="333746" cy="230832"/>
+            </a:xfrm>
+            <a:prstGeom prst="rect">
+              <a:avLst/>
+            </a:prstGeom>
+            <a:noFill/>
+          </p:spPr>
+          <p:txBody>
+            <a:bodyPr wrap="none" rtlCol="0">
+              <a:spAutoFit/>
+            </a:bodyPr>
+            <a:lstStyle/>
+            <a:p>
+              <a:r>
+                <a:rPr lang="en-US" sz="900" dirty="0" err="1">
+                  <a:latin typeface="Symbol" pitchFamily="2" charset="2"/>
+                  <a:cs typeface="Times New Roman" panose="02020603050405020304" pitchFamily="18" charset="0"/>
+                </a:rPr>
+                <a:t>D</a:t>
+              </a:r>
+              <a:r>
+                <a:rPr lang="en-US" sz="900" b="1" i="1" dirty="0" err="1">
+                  <a:latin typeface="Times New Roman" panose="02020603050405020304" pitchFamily="18" charset="0"/>
+                  <a:cs typeface="Times New Roman" panose="02020603050405020304" pitchFamily="18" charset="0"/>
+                </a:rPr>
+                <a:t>x</a:t>
+              </a:r>
+              <a:r>
+                <a:rPr lang="en-US" sz="900" i="1" baseline="-25000" dirty="0" err="1">
+                  <a:latin typeface="Times New Roman" panose="02020603050405020304" pitchFamily="18" charset="0"/>
+                  <a:cs typeface="Times New Roman" panose="02020603050405020304" pitchFamily="18" charset="0"/>
+                </a:rPr>
+                <a:t>i</a:t>
+              </a:r>
+              <a:endParaRPr lang="en-US" sz="900" baseline="-25000" dirty="0">
+                <a:latin typeface="Times New Roman" panose="02020603050405020304" pitchFamily="18" charset="0"/>
+                <a:cs typeface="Times New Roman" panose="02020603050405020304" pitchFamily="18" charset="0"/>
+              </a:endParaRPr>
+            </a:p>
+          </p:txBody>
+        </p:sp>
+        <p:sp>
+          <p:nvSpPr>
+            <p:cNvPr id="20" name="TextBox 19">
+              <a:extLst>
+                <a:ext uri="{FF2B5EF4-FFF2-40B4-BE49-F238E27FC236}">
+                  <a16:creationId xmlns:a16="http://schemas.microsoft.com/office/drawing/2014/main" id="{C1791D28-3DBB-B3F5-C2D1-08F7DEB314A2}"/>
+                </a:ext>
+              </a:extLst>
+            </p:cNvPr>
+            <p:cNvSpPr txBox="1"/>
+            <p:nvPr/>
+          </p:nvSpPr>
+          <p:spPr>
+            <a:xfrm>
+              <a:off x="1577924" y="5862384"/>
+              <a:ext cx="312906" cy="230832"/>
+            </a:xfrm>
+            <a:prstGeom prst="rect">
+              <a:avLst/>
+            </a:prstGeom>
+            <a:noFill/>
+          </p:spPr>
+          <p:txBody>
+            <a:bodyPr wrap="none" rtlCol="0">
+              <a:spAutoFit/>
+            </a:bodyPr>
+            <a:lstStyle/>
+            <a:p>
+              <a:r>
+                <a:rPr lang="en-US" sz="900" i="1" dirty="0">
+                  <a:latin typeface="Times New Roman" panose="02020603050405020304" pitchFamily="18" charset="0"/>
+                  <a:cs typeface="Times New Roman" panose="02020603050405020304" pitchFamily="18" charset="0"/>
+                </a:rPr>
+                <a:t>i</a:t>
+              </a:r>
+              <a:r>
+                <a:rPr lang="en-US" sz="900" dirty="0">
+                  <a:latin typeface="Times New Roman" panose="02020603050405020304" pitchFamily="18" charset="0"/>
+                  <a:cs typeface="Times New Roman" panose="02020603050405020304" pitchFamily="18" charset="0"/>
+                </a:rPr>
+                <a:t>-1</a:t>
+              </a:r>
+            </a:p>
+          </p:txBody>
+        </p:sp>
+        <p:sp>
+          <p:nvSpPr>
+            <p:cNvPr id="24" name="TextBox 23">
+              <a:extLst>
+                <a:ext uri="{FF2B5EF4-FFF2-40B4-BE49-F238E27FC236}">
+                  <a16:creationId xmlns:a16="http://schemas.microsoft.com/office/drawing/2014/main" id="{2E1AA594-1E8A-5252-F19A-3EB0154707E5}"/>
+                </a:ext>
+              </a:extLst>
+            </p:cNvPr>
+            <p:cNvSpPr txBox="1"/>
+            <p:nvPr/>
+          </p:nvSpPr>
+          <p:spPr>
+            <a:xfrm>
+              <a:off x="3010533" y="5512353"/>
+              <a:ext cx="352982" cy="230832"/>
+            </a:xfrm>
+            <a:prstGeom prst="rect">
+              <a:avLst/>
+            </a:prstGeom>
+            <a:noFill/>
+          </p:spPr>
+          <p:txBody>
+            <a:bodyPr wrap="none" rtlCol="0">
+              <a:spAutoFit/>
+            </a:bodyPr>
+            <a:lstStyle/>
+            <a:p>
+              <a:r>
+                <a:rPr lang="en-US" sz="900" i="1" dirty="0">
+                  <a:latin typeface="Times New Roman" panose="02020603050405020304" pitchFamily="18" charset="0"/>
+                  <a:cs typeface="Times New Roman" panose="02020603050405020304" pitchFamily="18" charset="0"/>
+                </a:rPr>
+                <a:t>i</a:t>
+              </a:r>
+              <a:r>
+                <a:rPr lang="en-US" sz="900" dirty="0">
+                  <a:latin typeface="Times New Roman" panose="02020603050405020304" pitchFamily="18" charset="0"/>
+                  <a:cs typeface="Times New Roman" panose="02020603050405020304" pitchFamily="18" charset="0"/>
+                </a:rPr>
+                <a:t>+1</a:t>
+              </a:r>
+            </a:p>
+          </p:txBody>
+        </p:sp>
+        <p:cxnSp>
+          <p:nvCxnSpPr>
+            <p:cNvPr id="34" name="Straight Connector 33">
+              <a:extLst>
+                <a:ext uri="{FF2B5EF4-FFF2-40B4-BE49-F238E27FC236}">
+                  <a16:creationId xmlns:a16="http://schemas.microsoft.com/office/drawing/2014/main" id="{2872850A-14B4-BEA7-0E40-736193B3B167}"/>
+                </a:ext>
+              </a:extLst>
+            </p:cNvPr>
+            <p:cNvCxnSpPr>
+              <a:cxnSpLocks/>
+            </p:cNvCxnSpPr>
+            <p:nvPr/>
+          </p:nvCxnSpPr>
+          <p:spPr>
+            <a:xfrm>
+              <a:off x="2484688" y="6087849"/>
+              <a:ext cx="597423" cy="24076"/>
+            </a:xfrm>
+            <a:prstGeom prst="line">
+              <a:avLst/>
+            </a:prstGeom>
+            <a:ln w="9525">
+              <a:solidFill>
+                <a:schemeClr val="tx1"/>
+              </a:solidFill>
+              <a:prstDash val="dash"/>
+            </a:ln>
+          </p:spPr>
+          <p:style>
+            <a:lnRef idx="2">
+              <a:schemeClr val="accent1"/>
+            </a:lnRef>
+            <a:fillRef idx="0">
+              <a:schemeClr val="accent1"/>
+            </a:fillRef>
+            <a:effectRef idx="1">
+              <a:schemeClr val="accent1"/>
+            </a:effectRef>
+            <a:fontRef idx="minor">
+              <a:schemeClr val="tx1"/>
+            </a:fontRef>
+          </p:style>
+        </p:cxnSp>
+        <p:sp>
+          <p:nvSpPr>
+            <p:cNvPr id="35" name="Arc 34">
+              <a:extLst>
+                <a:ext uri="{FF2B5EF4-FFF2-40B4-BE49-F238E27FC236}">
+                  <a16:creationId xmlns:a16="http://schemas.microsoft.com/office/drawing/2014/main" id="{3746E3C9-F489-A024-FC07-745351EE7930}"/>
+                </a:ext>
+              </a:extLst>
+            </p:cNvPr>
+            <p:cNvSpPr/>
+            <p:nvPr/>
+          </p:nvSpPr>
+          <p:spPr>
+            <a:xfrm>
+              <a:off x="2591183" y="5991660"/>
+              <a:ext cx="59961" cy="191125"/>
+            </a:xfrm>
+            <a:prstGeom prst="arc">
+              <a:avLst/>
+            </a:prstGeom>
+            <a:ln w="12700">
+              <a:solidFill>
+                <a:schemeClr val="tx1"/>
+              </a:solidFill>
+            </a:ln>
+          </p:spPr>
+          <p:style>
+            <a:lnRef idx="2">
+              <a:schemeClr val="accent1"/>
+            </a:lnRef>
+            <a:fillRef idx="0">
+              <a:schemeClr val="accent1"/>
+            </a:fillRef>
+            <a:effectRef idx="1">
+              <a:schemeClr val="accent1"/>
+            </a:effectRef>
+            <a:fontRef idx="minor">
+              <a:schemeClr val="tx1"/>
+            </a:fontRef>
+          </p:style>
+          <p:txBody>
+            <a:bodyPr rtlCol="0" anchor="ctr"/>
+            <a:lstStyle/>
+            <a:p>
+              <a:pPr algn="ctr"/>
+              <a:endParaRPr lang="en-US"/>
+            </a:p>
+          </p:txBody>
+        </p:sp>
+        <p:sp>
+          <p:nvSpPr>
+            <p:cNvPr id="36" name="TextBox 35">
+              <a:extLst>
+                <a:ext uri="{FF2B5EF4-FFF2-40B4-BE49-F238E27FC236}">
+                  <a16:creationId xmlns:a16="http://schemas.microsoft.com/office/drawing/2014/main" id="{26D65EA0-AE60-B445-D92A-70AE2E6F88C8}"/>
+                </a:ext>
+              </a:extLst>
+            </p:cNvPr>
+            <p:cNvSpPr txBox="1"/>
+            <p:nvPr/>
+          </p:nvSpPr>
+          <p:spPr>
+            <a:xfrm>
+              <a:off x="2610269" y="5890795"/>
+              <a:ext cx="266420" cy="230832"/>
+            </a:xfrm>
+            <a:prstGeom prst="rect">
+              <a:avLst/>
+            </a:prstGeom>
+            <a:noFill/>
+          </p:spPr>
+          <p:txBody>
+            <a:bodyPr wrap="none" rtlCol="0">
+              <a:spAutoFit/>
+            </a:bodyPr>
+            <a:lstStyle/>
+            <a:p>
+              <a:r>
+                <a:rPr lang="en-US" sz="900" i="1" dirty="0">
+                  <a:latin typeface="Symbol" pitchFamily="2" charset="2"/>
+                  <a:cs typeface="Times New Roman" panose="02020603050405020304" pitchFamily="18" charset="0"/>
+                </a:rPr>
+                <a:t>f</a:t>
+              </a:r>
+              <a:r>
+                <a:rPr lang="en-US" sz="900" i="1" baseline="-25000" dirty="0">
+                  <a:latin typeface="Times New Roman" panose="02020603050405020304" pitchFamily="18" charset="0"/>
+                  <a:cs typeface="Times New Roman" panose="02020603050405020304" pitchFamily="18" charset="0"/>
+                </a:rPr>
+                <a:t>i</a:t>
+              </a:r>
+              <a:endParaRPr lang="en-US" sz="900" baseline="-25000" dirty="0">
+                <a:latin typeface="Times New Roman" panose="02020603050405020304" pitchFamily="18" charset="0"/>
+                <a:cs typeface="Times New Roman" panose="02020603050405020304" pitchFamily="18" charset="0"/>
+              </a:endParaRPr>
+            </a:p>
+          </p:txBody>
+        </p:sp>
+        <p:cxnSp>
+          <p:nvCxnSpPr>
+            <p:cNvPr id="74" name="Straight Connector 73">
+              <a:extLst>
+                <a:ext uri="{FF2B5EF4-FFF2-40B4-BE49-F238E27FC236}">
+                  <a16:creationId xmlns:a16="http://schemas.microsoft.com/office/drawing/2014/main" id="{A925E0E8-D6B8-3C8C-B955-F5A2F339B717}"/>
+                </a:ext>
+              </a:extLst>
+            </p:cNvPr>
+            <p:cNvCxnSpPr>
+              <a:cxnSpLocks/>
+            </p:cNvCxnSpPr>
+            <p:nvPr/>
+          </p:nvCxnSpPr>
+          <p:spPr>
+            <a:xfrm>
+              <a:off x="2320514" y="5591767"/>
+              <a:ext cx="164957" cy="496394"/>
+            </a:xfrm>
+            <a:prstGeom prst="line">
+              <a:avLst/>
+            </a:prstGeom>
+            <a:ln>
+              <a:solidFill>
+                <a:srgbClr val="0070C0"/>
+              </a:solidFill>
+            </a:ln>
+          </p:spPr>
+          <p:style>
+            <a:lnRef idx="2">
+              <a:schemeClr val="accent1"/>
+            </a:lnRef>
+            <a:fillRef idx="0">
+              <a:schemeClr val="accent1"/>
+            </a:fillRef>
+            <a:effectRef idx="1">
+              <a:schemeClr val="accent1"/>
+            </a:effectRef>
+            <a:fontRef idx="minor">
+              <a:schemeClr val="tx1"/>
+            </a:fontRef>
+          </p:style>
+        </p:cxnSp>
+        <p:sp>
+          <p:nvSpPr>
+            <p:cNvPr id="86" name="Arc 85">
+              <a:extLst>
+                <a:ext uri="{FF2B5EF4-FFF2-40B4-BE49-F238E27FC236}">
+                  <a16:creationId xmlns:a16="http://schemas.microsoft.com/office/drawing/2014/main" id="{6A44FD7A-CEBD-FBF0-CBE2-A374E612D1DA}"/>
+                </a:ext>
+              </a:extLst>
+            </p:cNvPr>
+            <p:cNvSpPr/>
+            <p:nvPr/>
+          </p:nvSpPr>
+          <p:spPr>
+            <a:xfrm flipH="1" flipV="1">
+              <a:off x="2912390" y="5526201"/>
+              <a:ext cx="59961" cy="191125"/>
+            </a:xfrm>
+            <a:prstGeom prst="arc">
+              <a:avLst/>
+            </a:prstGeom>
+            <a:ln w="12700">
+              <a:solidFill>
+                <a:schemeClr val="tx1"/>
+              </a:solidFill>
+            </a:ln>
+          </p:spPr>
+          <p:style>
+            <a:lnRef idx="2">
+              <a:schemeClr val="accent1"/>
+            </a:lnRef>
+            <a:fillRef idx="0">
+              <a:schemeClr val="accent1"/>
+            </a:fillRef>
+            <a:effectRef idx="1">
+              <a:schemeClr val="accent1"/>
+            </a:effectRef>
+            <a:fontRef idx="minor">
+              <a:schemeClr val="tx1"/>
+            </a:fontRef>
+          </p:style>
+          <p:txBody>
+            <a:bodyPr rtlCol="0" anchor="ctr"/>
+            <a:lstStyle/>
+            <a:p>
+              <a:pPr algn="ctr"/>
+              <a:endParaRPr lang="en-US"/>
+            </a:p>
+          </p:txBody>
+        </p:sp>
+        <p:sp>
+          <p:nvSpPr>
+            <p:cNvPr id="87" name="TextBox 86">
+              <a:extLst>
+                <a:ext uri="{FF2B5EF4-FFF2-40B4-BE49-F238E27FC236}">
+                  <a16:creationId xmlns:a16="http://schemas.microsoft.com/office/drawing/2014/main" id="{8016F019-4E95-8D4C-66F8-914D5BF0C433}"/>
+                </a:ext>
+              </a:extLst>
+            </p:cNvPr>
+            <p:cNvSpPr txBox="1"/>
+            <p:nvPr/>
+          </p:nvSpPr>
+          <p:spPr>
+            <a:xfrm>
+              <a:off x="2687338" y="5559868"/>
+              <a:ext cx="266420" cy="230832"/>
+            </a:xfrm>
+            <a:prstGeom prst="rect">
+              <a:avLst/>
+            </a:prstGeom>
+            <a:noFill/>
+          </p:spPr>
+          <p:txBody>
+            <a:bodyPr wrap="none" rtlCol="0">
+              <a:spAutoFit/>
+            </a:bodyPr>
+            <a:lstStyle/>
+            <a:p>
+              <a:r>
+                <a:rPr lang="en-US" sz="900" i="1" dirty="0">
+                  <a:latin typeface="Symbol" pitchFamily="2" charset="2"/>
+                  <a:cs typeface="Times New Roman" panose="02020603050405020304" pitchFamily="18" charset="0"/>
+                </a:rPr>
+                <a:t>f</a:t>
+              </a:r>
+              <a:r>
+                <a:rPr lang="en-US" sz="900" i="1" baseline="-25000" dirty="0">
+                  <a:latin typeface="Times New Roman" panose="02020603050405020304" pitchFamily="18" charset="0"/>
+                  <a:cs typeface="Times New Roman" panose="02020603050405020304" pitchFamily="18" charset="0"/>
+                </a:rPr>
+                <a:t>i</a:t>
+              </a:r>
+              <a:endParaRPr lang="en-US" sz="900" baseline="-25000" dirty="0">
+                <a:latin typeface="Times New Roman" panose="02020603050405020304" pitchFamily="18" charset="0"/>
+                <a:cs typeface="Times New Roman" panose="02020603050405020304" pitchFamily="18" charset="0"/>
+              </a:endParaRPr>
+            </a:p>
+          </p:txBody>
+        </p:sp>
+        <p:sp>
+          <p:nvSpPr>
+            <p:cNvPr id="88" name="TextBox 87">
+              <a:extLst>
+                <a:ext uri="{FF2B5EF4-FFF2-40B4-BE49-F238E27FC236}">
+                  <a16:creationId xmlns:a16="http://schemas.microsoft.com/office/drawing/2014/main" id="{EC634D7A-E1A3-670C-CACB-E34F82B0C940}"/>
+                </a:ext>
+              </a:extLst>
+            </p:cNvPr>
+            <p:cNvSpPr txBox="1"/>
+            <p:nvPr/>
+          </p:nvSpPr>
+          <p:spPr>
+            <a:xfrm>
+              <a:off x="1865084" y="5705182"/>
+              <a:ext cx="611065" cy="230832"/>
+            </a:xfrm>
+            <a:prstGeom prst="rect">
+              <a:avLst/>
+            </a:prstGeom>
+            <a:noFill/>
+          </p:spPr>
+          <p:txBody>
+            <a:bodyPr wrap="none" rtlCol="0">
+              <a:spAutoFit/>
+            </a:bodyPr>
+            <a:lstStyle/>
+            <a:p>
+              <a:r>
+                <a:rPr lang="en-US" sz="900" dirty="0">
+                  <a:solidFill>
+                    <a:srgbClr val="0070C0"/>
+                  </a:solidFill>
+                  <a:latin typeface="Symbol" pitchFamily="2" charset="2"/>
+                  <a:cs typeface="Times New Roman" panose="02020603050405020304" pitchFamily="18" charset="0"/>
+                </a:rPr>
+                <a:t>D</a:t>
+              </a:r>
+              <a:r>
+                <a:rPr lang="en-US" sz="900" b="1" i="1" dirty="0">
+                  <a:solidFill>
+                    <a:srgbClr val="0070C0"/>
+                  </a:solidFill>
+                  <a:latin typeface="Times New Roman" panose="02020603050405020304" pitchFamily="18" charset="0"/>
+                  <a:cs typeface="Times New Roman" panose="02020603050405020304" pitchFamily="18" charset="0"/>
+                </a:rPr>
+                <a:t>x</a:t>
+              </a:r>
+              <a:r>
+                <a:rPr lang="en-US" sz="900" i="1" baseline="-25000" dirty="0">
+                  <a:solidFill>
+                    <a:srgbClr val="0070C0"/>
+                  </a:solidFill>
+                  <a:latin typeface="Times New Roman" panose="02020603050405020304" pitchFamily="18" charset="0"/>
+                  <a:cs typeface="Times New Roman" panose="02020603050405020304" pitchFamily="18" charset="0"/>
+                </a:rPr>
+                <a:t>i</a:t>
+              </a:r>
+              <a:r>
+                <a:rPr lang="en-US" sz="900" dirty="0">
+                  <a:solidFill>
+                    <a:srgbClr val="0070C0"/>
+                  </a:solidFill>
+                  <a:latin typeface="Symbol" pitchFamily="2" charset="2"/>
+                  <a:cs typeface="Times New Roman" panose="02020603050405020304" pitchFamily="18" charset="0"/>
+                </a:rPr>
+                <a:t>-D</a:t>
+              </a:r>
+              <a:r>
+                <a:rPr lang="en-US" sz="900" b="1" i="1" dirty="0">
+                  <a:solidFill>
+                    <a:srgbClr val="0070C0"/>
+                  </a:solidFill>
+                  <a:latin typeface="Times New Roman" panose="02020603050405020304" pitchFamily="18" charset="0"/>
+                  <a:cs typeface="Times New Roman" panose="02020603050405020304" pitchFamily="18" charset="0"/>
+                </a:rPr>
+                <a:t>x</a:t>
+              </a:r>
+              <a:r>
+                <a:rPr lang="en-US" sz="900" i="1" baseline="-25000" dirty="0">
+                  <a:solidFill>
+                    <a:srgbClr val="0070C0"/>
+                  </a:solidFill>
+                  <a:latin typeface="Times New Roman" panose="02020603050405020304" pitchFamily="18" charset="0"/>
+                  <a:cs typeface="Times New Roman" panose="02020603050405020304" pitchFamily="18" charset="0"/>
+                </a:rPr>
+                <a:t>i</a:t>
+              </a:r>
+              <a:r>
+                <a:rPr lang="en-US" sz="900" baseline="-25000" dirty="0">
+                  <a:solidFill>
+                    <a:srgbClr val="0070C0"/>
+                  </a:solidFill>
+                  <a:latin typeface="Times New Roman" panose="02020603050405020304" pitchFamily="18" charset="0"/>
+                  <a:cs typeface="Times New Roman" panose="02020603050405020304" pitchFamily="18" charset="0"/>
+                </a:rPr>
+                <a:t>-1</a:t>
+              </a:r>
+            </a:p>
+          </p:txBody>
+        </p:sp>
+        <p:sp>
+          <p:nvSpPr>
+            <p:cNvPr id="89" name="TextBox 88">
+              <a:extLst>
+                <a:ext uri="{FF2B5EF4-FFF2-40B4-BE49-F238E27FC236}">
+                  <a16:creationId xmlns:a16="http://schemas.microsoft.com/office/drawing/2014/main" id="{42828E2C-67B1-0AAB-876B-438C214EB8B3}"/>
+                </a:ext>
+              </a:extLst>
+            </p:cNvPr>
+            <p:cNvSpPr txBox="1"/>
+            <p:nvPr/>
+          </p:nvSpPr>
+          <p:spPr>
+            <a:xfrm>
+              <a:off x="2387852" y="6073777"/>
+              <a:ext cx="216726" cy="230832"/>
+            </a:xfrm>
+            <a:prstGeom prst="rect">
+              <a:avLst/>
+            </a:prstGeom>
+            <a:noFill/>
+          </p:spPr>
+          <p:txBody>
+            <a:bodyPr wrap="none" rtlCol="0">
+              <a:spAutoFit/>
+            </a:bodyPr>
+            <a:lstStyle/>
+            <a:p>
+              <a:r>
+                <a:rPr lang="en-US" sz="900" i="1" dirty="0" err="1">
+                  <a:latin typeface="Times New Roman" panose="02020603050405020304" pitchFamily="18" charset="0"/>
+                  <a:cs typeface="Times New Roman" panose="02020603050405020304" pitchFamily="18" charset="0"/>
+                </a:rPr>
+                <a:t>i</a:t>
+              </a:r>
+              <a:endParaRPr lang="en-US" sz="900" dirty="0">
+                <a:latin typeface="Times New Roman" panose="02020603050405020304" pitchFamily="18" charset="0"/>
+                <a:cs typeface="Times New Roman" panose="02020603050405020304" pitchFamily="18" charset="0"/>
+              </a:endParaRPr>
+            </a:p>
+          </p:txBody>
+        </p:sp>
+        <p:cxnSp>
+          <p:nvCxnSpPr>
+            <p:cNvPr id="27" name="Straight Connector 26">
+              <a:extLst>
+                <a:ext uri="{FF2B5EF4-FFF2-40B4-BE49-F238E27FC236}">
+                  <a16:creationId xmlns:a16="http://schemas.microsoft.com/office/drawing/2014/main" id="{CFFBB080-0900-12B5-74C4-AD717F987DD8}"/>
+                </a:ext>
+              </a:extLst>
+            </p:cNvPr>
+            <p:cNvCxnSpPr>
+              <a:cxnSpLocks/>
+            </p:cNvCxnSpPr>
+            <p:nvPr/>
+          </p:nvCxnSpPr>
+          <p:spPr>
+            <a:xfrm>
+              <a:off x="2312232" y="5587584"/>
+              <a:ext cx="765755" cy="28942"/>
+            </a:xfrm>
+            <a:prstGeom prst="line">
+              <a:avLst/>
+            </a:prstGeom>
+            <a:ln>
+              <a:solidFill>
+                <a:schemeClr val="tx1"/>
+              </a:solidFill>
             </a:ln>
           </p:spPr>
           <p:style>

</xml_diff>